<commit_message>
Update pic in ppt(sy)
</commit_message>
<xml_diff>
--- a/R/Data8/pic/Pic.pptx
+++ b/R/Data8/pic/Pic.pptx
@@ -10,11 +10,15 @@
     <p:sldId id="257" r:id="rId5"/>
     <p:sldId id="259" r:id="rId6"/>
     <p:sldId id="260" r:id="rId7"/>
+    <p:sldId id="263" r:id="rId8"/>
+    <p:sldId id="264" r:id="rId9"/>
+    <p:sldId id="266" r:id="rId10"/>
+    <p:sldId id="265" r:id="rId11"/>
   </p:sldIdLst>
   <p:sldSz cx="12192000" cy="6858000"/>
   <p:notesSz cx="6858000" cy="9144000"/>
   <p:custDataLst>
-    <p:tags r:id="rId11"/>
+    <p:tags r:id="rId15"/>
   </p:custDataLst>
   <p:defaultTextStyle>
     <a:defPPr>
@@ -3499,6 +3503,224 @@
 </p:sld>
 </file>
 
+<file path=ppt/slides/slide6.xml><?xml version="1.0" encoding="utf-8"?>
+<p:sld xmlns:a="http://schemas.openxmlformats.org/drawingml/2006/main" xmlns:r="http://schemas.openxmlformats.org/officeDocument/2006/relationships" xmlns:p="http://schemas.openxmlformats.org/presentationml/2006/main">
+  <p:cSld>
+    <p:spTree>
+      <p:nvGrpSpPr>
+        <p:cNvPr id="1" name=""/>
+        <p:cNvGrpSpPr/>
+        <p:nvPr/>
+      </p:nvGrpSpPr>
+      <p:grpSpPr>
+        <a:xfrm>
+          <a:off x="0" y="0"/>
+          <a:ext cx="0" cy="0"/>
+          <a:chOff x="0" y="0"/>
+          <a:chExt cx="0" cy="0"/>
+        </a:xfrm>
+      </p:grpSpPr>
+    </p:spTree>
+    <p:custDataLst>
+      <p:tags r:id="rId1"/>
+    </p:custDataLst>
+  </p:cSld>
+  <p:clrMapOvr>
+    <a:masterClrMapping/>
+  </p:clrMapOvr>
+</p:sld>
+</file>
+
+<file path=ppt/slides/slide7.xml><?xml version="1.0" encoding="utf-8"?>
+<p:sld xmlns:a="http://schemas.openxmlformats.org/drawingml/2006/main" xmlns:r="http://schemas.openxmlformats.org/officeDocument/2006/relationships" xmlns:p="http://schemas.openxmlformats.org/presentationml/2006/main">
+  <p:cSld>
+    <p:spTree>
+      <p:nvGrpSpPr>
+        <p:cNvPr id="1" name=""/>
+        <p:cNvGrpSpPr/>
+        <p:nvPr/>
+      </p:nvGrpSpPr>
+      <p:grpSpPr>
+        <a:xfrm>
+          <a:off x="0" y="0"/>
+          <a:ext cx="0" cy="0"/>
+          <a:chOff x="0" y="0"/>
+          <a:chExt cx="0" cy="0"/>
+        </a:xfrm>
+      </p:grpSpPr>
+      <p:pic>
+        <p:nvPicPr>
+          <p:cNvPr id="4" name="图片 3"/>
+          <p:cNvPicPr>
+            <a:picLocks noChangeAspect="1"/>
+          </p:cNvPicPr>
+          <p:nvPr/>
+        </p:nvPicPr>
+        <p:blipFill>
+          <a:blip r:embed="rId1"/>
+          <a:stretch>
+            <a:fillRect/>
+          </a:stretch>
+        </p:blipFill>
+        <p:spPr>
+          <a:xfrm>
+            <a:off x="1440815" y="549275"/>
+            <a:ext cx="9310634" cy="5760000"/>
+          </a:xfrm>
+          <a:prstGeom prst="rect">
+            <a:avLst/>
+          </a:prstGeom>
+        </p:spPr>
+      </p:pic>
+      <p:sp>
+        <p:nvSpPr>
+          <p:cNvPr id="5" name="文本框 4"/>
+          <p:cNvSpPr txBox="1"/>
+          <p:nvPr/>
+        </p:nvSpPr>
+        <p:spPr>
+          <a:xfrm>
+            <a:off x="1485265" y="180975"/>
+            <a:ext cx="4064000" cy="368300"/>
+          </a:xfrm>
+          <a:prstGeom prst="rect">
+            <a:avLst/>
+          </a:prstGeom>
+          <a:noFill/>
+        </p:spPr>
+        <p:txBody>
+          <a:bodyPr wrap="square" rtlCol="0">
+            <a:spAutoFit/>
+          </a:bodyPr>
+          <a:p>
+            <a:r>
+              <a:rPr lang="en-US" altLang="zh-CN"/>
+              <a:t>Color Task</a:t>
+            </a:r>
+            <a:endParaRPr lang="en-US" altLang="zh-CN"/>
+          </a:p>
+        </p:txBody>
+      </p:sp>
+    </p:spTree>
+    <p:custDataLst>
+      <p:tags r:id="rId2"/>
+    </p:custDataLst>
+  </p:cSld>
+  <p:clrMapOvr>
+    <a:masterClrMapping/>
+  </p:clrMapOvr>
+</p:sld>
+</file>
+
+<file path=ppt/slides/slide8.xml><?xml version="1.0" encoding="utf-8"?>
+<p:sld xmlns:a="http://schemas.openxmlformats.org/drawingml/2006/main" xmlns:r="http://schemas.openxmlformats.org/officeDocument/2006/relationships" xmlns:p="http://schemas.openxmlformats.org/presentationml/2006/main">
+  <p:cSld>
+    <p:spTree>
+      <p:nvGrpSpPr>
+        <p:cNvPr id="1" name=""/>
+        <p:cNvGrpSpPr/>
+        <p:nvPr/>
+      </p:nvGrpSpPr>
+      <p:grpSpPr>
+        <a:xfrm>
+          <a:off x="0" y="0"/>
+          <a:ext cx="0" cy="0"/>
+          <a:chOff x="0" y="0"/>
+          <a:chExt cx="0" cy="0"/>
+        </a:xfrm>
+      </p:grpSpPr>
+      <p:pic>
+        <p:nvPicPr>
+          <p:cNvPr id="2" name="图片 1"/>
+          <p:cNvPicPr>
+            <a:picLocks noChangeAspect="1"/>
+          </p:cNvPicPr>
+          <p:nvPr/>
+        </p:nvPicPr>
+        <p:blipFill>
+          <a:blip r:embed="rId1"/>
+          <a:stretch>
+            <a:fillRect/>
+          </a:stretch>
+        </p:blipFill>
+        <p:spPr>
+          <a:xfrm>
+            <a:off x="1485265" y="521335"/>
+            <a:ext cx="9310685" cy="5760000"/>
+          </a:xfrm>
+          <a:prstGeom prst="rect">
+            <a:avLst/>
+          </a:prstGeom>
+        </p:spPr>
+      </p:pic>
+      <p:sp>
+        <p:nvSpPr>
+          <p:cNvPr id="3" name="文本框 2"/>
+          <p:cNvSpPr txBox="1"/>
+          <p:nvPr/>
+        </p:nvSpPr>
+        <p:spPr>
+          <a:xfrm>
+            <a:off x="1612265" y="153035"/>
+            <a:ext cx="4064000" cy="368300"/>
+          </a:xfrm>
+          <a:prstGeom prst="rect">
+            <a:avLst/>
+          </a:prstGeom>
+          <a:noFill/>
+        </p:spPr>
+        <p:txBody>
+          <a:bodyPr wrap="square" rtlCol="0">
+            <a:spAutoFit/>
+          </a:bodyPr>
+          <a:p>
+            <a:r>
+              <a:rPr lang="en-US" altLang="zh-CN"/>
+              <a:t>MotionTask</a:t>
+            </a:r>
+            <a:endParaRPr lang="en-US" altLang="zh-CN"/>
+          </a:p>
+        </p:txBody>
+      </p:sp>
+    </p:spTree>
+    <p:custDataLst>
+      <p:tags r:id="rId2"/>
+    </p:custDataLst>
+  </p:cSld>
+  <p:clrMapOvr>
+    <a:masterClrMapping/>
+  </p:clrMapOvr>
+</p:sld>
+</file>
+
+<file path=ppt/slides/slide9.xml><?xml version="1.0" encoding="utf-8"?>
+<p:sld xmlns:a="http://schemas.openxmlformats.org/drawingml/2006/main" xmlns:r="http://schemas.openxmlformats.org/officeDocument/2006/relationships" xmlns:p="http://schemas.openxmlformats.org/presentationml/2006/main">
+  <p:cSld>
+    <p:spTree>
+      <p:nvGrpSpPr>
+        <p:cNvPr id="1" name=""/>
+        <p:cNvGrpSpPr/>
+        <p:nvPr/>
+      </p:nvGrpSpPr>
+      <p:grpSpPr>
+        <a:xfrm>
+          <a:off x="0" y="0"/>
+          <a:ext cx="0" cy="0"/>
+          <a:chOff x="0" y="0"/>
+          <a:chExt cx="0" cy="0"/>
+        </a:xfrm>
+      </p:grpSpPr>
+    </p:spTree>
+    <p:custDataLst>
+      <p:tags r:id="rId1"/>
+    </p:custDataLst>
+  </p:cSld>
+  <p:clrMapOvr>
+    <a:masterClrMapping/>
+  </p:clrMapOvr>
+</p:sld>
+</file>
+
 <file path=ppt/tags/tag1.xml><?xml version="1.0" encoding="utf-8"?>
 <p:tagLst xmlns:p="http://schemas.openxmlformats.org/presentationml/2006/main">
   <p:tag name="KSO_WM_UNIT_HIGHLIGHT" val="0"/>
@@ -4378,20 +4600,104 @@
 
 <file path=ppt/tags/tag68.xml><?xml version="1.0" encoding="utf-8"?>
 <p:tagLst xmlns:p="http://schemas.openxmlformats.org/presentationml/2006/main">
+  <p:tag name="KSO_WM_SLIDE_ID" val="custom20205081_1"/>
+  <p:tag name="KSO_WM_TEMPLATE_SUBCATEGORY" val="19"/>
+  <p:tag name="KSO_WM_TEMPLATE_MASTER_TYPE" val="0"/>
+  <p:tag name="KSO_WM_TEMPLATE_COLOR_TYPE" val="1"/>
+  <p:tag name="KSO_WM_SLIDE_TYPE" val="title"/>
+  <p:tag name="KSO_WM_SLIDE_SUBTYPE" val="defaultBlank"/>
+  <p:tag name="KSO_WM_SLIDE_ITEM_CNT" val="0"/>
+  <p:tag name="KSO_WM_SLIDE_INDEX" val="1"/>
+  <p:tag name="KSO_WM_TAG_VERSION" val="1.0"/>
+  <p:tag name="KSO_WM_BEAUTIFY_FLAG" val="#wm#"/>
+  <p:tag name="KSO_WM_TEMPLATE_CATEGORY" val="custom"/>
+  <p:tag name="KSO_WM_TEMPLATE_INDEX" val="20205081"/>
+  <p:tag name="KSO_WM_SLIDE_LAYOUT" val="a_b"/>
+  <p:tag name="KSO_WM_SLIDE_LAYOUT_CNT" val="1_1"/>
+  <p:tag name="KSO_WM_UNIT_SHOW_EDIT_AREA_INDICATION" val="1"/>
+  <p:tag name="KSO_WM_TEMPLATE_THUMBS_INDEX" val="1、4、7、12、13、14、15、16、17、18、20、24、25、28、33、36、40、43、44"/>
+</p:tagLst>
+</file>
+
+<file path=ppt/tags/tag69.xml><?xml version="1.0" encoding="utf-8"?>
+<p:tagLst xmlns:p="http://schemas.openxmlformats.org/presentationml/2006/main">
+  <p:tag name="KSO_WM_SLIDE_ID" val="custom20205081_1"/>
+  <p:tag name="KSO_WM_TEMPLATE_SUBCATEGORY" val="19"/>
+  <p:tag name="KSO_WM_TEMPLATE_MASTER_TYPE" val="0"/>
+  <p:tag name="KSO_WM_TEMPLATE_COLOR_TYPE" val="1"/>
+  <p:tag name="KSO_WM_SLIDE_TYPE" val="title"/>
+  <p:tag name="KSO_WM_SLIDE_SUBTYPE" val="defaultBlank"/>
+  <p:tag name="KSO_WM_SLIDE_ITEM_CNT" val="0"/>
+  <p:tag name="KSO_WM_SLIDE_INDEX" val="1"/>
+  <p:tag name="KSO_WM_TAG_VERSION" val="1.0"/>
+  <p:tag name="KSO_WM_BEAUTIFY_FLAG" val="#wm#"/>
+  <p:tag name="KSO_WM_TEMPLATE_CATEGORY" val="custom"/>
+  <p:tag name="KSO_WM_TEMPLATE_INDEX" val="20205081"/>
+  <p:tag name="KSO_WM_SLIDE_LAYOUT" val="a_b"/>
+  <p:tag name="KSO_WM_SLIDE_LAYOUT_CNT" val="1_1"/>
+  <p:tag name="KSO_WM_UNIT_SHOW_EDIT_AREA_INDICATION" val="1"/>
+  <p:tag name="KSO_WM_TEMPLATE_THUMBS_INDEX" val="1、4、7、12、13、14、15、16、17、18、20、24、25、28、33、36、40、43、44"/>
+</p:tagLst>
+</file>
+
+<file path=ppt/tags/tag7.xml><?xml version="1.0" encoding="utf-8"?>
+<p:tagLst xmlns:p="http://schemas.openxmlformats.org/presentationml/2006/main">
+  <p:tag name="KSO_WM_UNIT_HIGHLIGHT" val="0"/>
+  <p:tag name="KSO_WM_UNIT_COMPATIBLE" val="0"/>
+  <p:tag name="KSO_WM_UNIT_DIAGRAM_ISNUMVISUAL" val="0"/>
+  <p:tag name="KSO_WM_UNIT_DIAGRAM_ISREFERUNIT" val="0"/>
+  <p:tag name="KSO_WM_UNIT_ID" val="_2**"/>
+  <p:tag name="KSO_WM_UNIT_LAYERLEVEL" val="1"/>
+  <p:tag name="KSO_WM_TAG_VERSION" val="1.0"/>
+  <p:tag name="KSO_WM_BEAUTIFY_FLAG" val="#wm#"/>
+</p:tagLst>
+</file>
+
+<file path=ppt/tags/tag70.xml><?xml version="1.0" encoding="utf-8"?>
+<p:tagLst xmlns:p="http://schemas.openxmlformats.org/presentationml/2006/main">
+  <p:tag name="KSO_WM_SLIDE_ID" val="custom20205081_1"/>
+  <p:tag name="KSO_WM_TEMPLATE_SUBCATEGORY" val="19"/>
+  <p:tag name="KSO_WM_TEMPLATE_MASTER_TYPE" val="0"/>
+  <p:tag name="KSO_WM_TEMPLATE_COLOR_TYPE" val="1"/>
+  <p:tag name="KSO_WM_SLIDE_TYPE" val="title"/>
+  <p:tag name="KSO_WM_SLIDE_SUBTYPE" val="defaultBlank"/>
+  <p:tag name="KSO_WM_SLIDE_ITEM_CNT" val="0"/>
+  <p:tag name="KSO_WM_SLIDE_INDEX" val="1"/>
+  <p:tag name="KSO_WM_TAG_VERSION" val="1.0"/>
+  <p:tag name="KSO_WM_BEAUTIFY_FLAG" val="#wm#"/>
+  <p:tag name="KSO_WM_TEMPLATE_CATEGORY" val="custom"/>
+  <p:tag name="KSO_WM_TEMPLATE_INDEX" val="20205081"/>
+  <p:tag name="KSO_WM_SLIDE_LAYOUT" val="a_b"/>
+  <p:tag name="KSO_WM_SLIDE_LAYOUT_CNT" val="1_1"/>
+  <p:tag name="KSO_WM_UNIT_SHOW_EDIT_AREA_INDICATION" val="1"/>
+  <p:tag name="KSO_WM_TEMPLATE_THUMBS_INDEX" val="1、4、7、12、13、14、15、16、17、18、20、24、25、28、33、36、40、43、44"/>
+</p:tagLst>
+</file>
+
+<file path=ppt/tags/tag71.xml><?xml version="1.0" encoding="utf-8"?>
+<p:tagLst xmlns:p="http://schemas.openxmlformats.org/presentationml/2006/main">
+  <p:tag name="KSO_WM_SLIDE_ID" val="custom20205081_1"/>
+  <p:tag name="KSO_WM_TEMPLATE_SUBCATEGORY" val="19"/>
+  <p:tag name="KSO_WM_TEMPLATE_MASTER_TYPE" val="0"/>
+  <p:tag name="KSO_WM_TEMPLATE_COLOR_TYPE" val="1"/>
+  <p:tag name="KSO_WM_SLIDE_TYPE" val="title"/>
+  <p:tag name="KSO_WM_SLIDE_SUBTYPE" val="defaultBlank"/>
+  <p:tag name="KSO_WM_SLIDE_ITEM_CNT" val="0"/>
+  <p:tag name="KSO_WM_SLIDE_INDEX" val="1"/>
+  <p:tag name="KSO_WM_TAG_VERSION" val="1.0"/>
+  <p:tag name="KSO_WM_BEAUTIFY_FLAG" val="#wm#"/>
+  <p:tag name="KSO_WM_TEMPLATE_CATEGORY" val="custom"/>
+  <p:tag name="KSO_WM_TEMPLATE_INDEX" val="20205081"/>
+  <p:tag name="KSO_WM_SLIDE_LAYOUT" val="a_b"/>
+  <p:tag name="KSO_WM_SLIDE_LAYOUT_CNT" val="1_1"/>
+  <p:tag name="KSO_WM_UNIT_SHOW_EDIT_AREA_INDICATION" val="1"/>
+  <p:tag name="KSO_WM_TEMPLATE_THUMBS_INDEX" val="1、4、7、12、13、14、15、16、17、18、20、24、25、28、33、36、40、43、44"/>
+</p:tagLst>
+</file>
+
+<file path=ppt/tags/tag72.xml><?xml version="1.0" encoding="utf-8"?>
+<p:tagLst xmlns:p="http://schemas.openxmlformats.org/presentationml/2006/main">
   <p:tag name="commondata" val="eyJoZGlkIjoiNmU4ODM1N2NlZDYxNjc5NmRmYjBjNTIzODg0N2Q5ZTQifQ=="/>
-</p:tagLst>
-</file>
-
-<file path=ppt/tags/tag7.xml><?xml version="1.0" encoding="utf-8"?>
-<p:tagLst xmlns:p="http://schemas.openxmlformats.org/presentationml/2006/main">
-  <p:tag name="KSO_WM_UNIT_HIGHLIGHT" val="0"/>
-  <p:tag name="KSO_WM_UNIT_COMPATIBLE" val="0"/>
-  <p:tag name="KSO_WM_UNIT_DIAGRAM_ISNUMVISUAL" val="0"/>
-  <p:tag name="KSO_WM_UNIT_DIAGRAM_ISREFERUNIT" val="0"/>
-  <p:tag name="KSO_WM_UNIT_ID" val="_2**"/>
-  <p:tag name="KSO_WM_UNIT_LAYERLEVEL" val="1"/>
-  <p:tag name="KSO_WM_TAG_VERSION" val="1.0"/>
-  <p:tag name="KSO_WM_BEAUTIFY_FLAG" val="#wm#"/>
 </p:tagLst>
 </file>
 

</xml_diff>